<commit_message>
Updated BDS slide to reflect latest approved design
</commit_message>
<xml_diff>
--- a/decks/02_phd_hawq_presentation.pptx
+++ b/decks/02_phd_hawq_presentation.pptx
@@ -132,7 +132,7 @@
   </p:defaultTextStyle>
   <p:extLst>
     <p:ext uri="{EFAFB233-063F-42B5-8137-9DF3F51BA10A}">
-      <p15:sldGuideLst xmlns="" xmlns:p15="http://schemas.microsoft.com/office/powerpoint/2012/main" xmlns:mv="urn:schemas-microsoft-com:mac:vml" xmlns:mc="http://schemas.openxmlformats.org/markup-compatibility/2006">
+      <p15:sldGuideLst xmlns:mc="http://schemas.openxmlformats.org/markup-compatibility/2006" xmlns:mv="urn:schemas-microsoft-com:mac:vml" xmlns:p15="http://schemas.microsoft.com/office/powerpoint/2012/main" xmlns="">
         <p15:guide id="1" orient="horz" pos="1716">
           <p15:clr>
             <a:srgbClr val="A4A3A4"/>
@@ -146,7 +146,7 @@
       </p15:sldGuideLst>
     </p:ext>
     <p:ext uri="{2D200454-40CA-4A62-9FC3-DE9A4176ACB9}">
-      <p15:notesGuideLst xmlns="" xmlns:p15="http://schemas.microsoft.com/office/powerpoint/2012/main" xmlns:mv="urn:schemas-microsoft-com:mac:vml" xmlns:mc="http://schemas.openxmlformats.org/markup-compatibility/2006">
+      <p15:notesGuideLst xmlns:mc="http://schemas.openxmlformats.org/markup-compatibility/2006" xmlns:mv="urn:schemas-microsoft-com:mac:vml" xmlns:p15="http://schemas.microsoft.com/office/powerpoint/2012/main" xmlns="">
         <p15:guide id="1" orient="horz" pos="110">
           <p15:clr>
             <a:srgbClr val="A4A3A4"/>
@@ -20809,13 +20809,8 @@
             </a:pPr>
             <a:r>
               <a:rPr lang="en-US" sz="1500" dirty="0" smtClean="0"/>
-              <a:t>External tables are the most efficient way to load data into </a:t>
-            </a:r>
-            <a:r>
-              <a:rPr lang="en-US" sz="1500" dirty="0" smtClean="0"/>
-              <a:t>HAWQ</a:t>
-            </a:r>
-            <a:endParaRPr lang="en-US" sz="1500" dirty="0" smtClean="0"/>
+              <a:t>External tables are the most efficient way to load data into HAWQ</a:t>
+            </a:r>
           </a:p>
           <a:p>
             <a:pPr>
@@ -20836,13 +20831,8 @@
             </a:pPr>
             <a:r>
               <a:rPr lang="en-US" sz="1500" dirty="0" smtClean="0"/>
-              <a:t>External tables are a logical view of the file on HDFS</a:t>
-            </a:r>
-            <a:r>
-              <a:rPr lang="en-US" sz="1500" dirty="0" smtClean="0"/>
-              <a:t>.</a:t>
-            </a:r>
-            <a:endParaRPr lang="en-US" sz="1500" dirty="0" smtClean="0"/>
+              <a:t>External tables are a logical view of the file on HDFS.</a:t>
+            </a:r>
           </a:p>
           <a:p>
             <a:pPr>
@@ -20852,13 +20842,8 @@
             </a:pPr>
             <a:r>
               <a:rPr lang="en-US" sz="1500" dirty="0" smtClean="0"/>
-              <a:t>External tables are simple, use SQL and can be used to transform the data in </a:t>
-            </a:r>
-            <a:r>
-              <a:rPr lang="en-US" sz="1500" dirty="0" smtClean="0"/>
-              <a:t>flight</a:t>
-            </a:r>
-            <a:endParaRPr lang="en-US" sz="1500" dirty="0" smtClean="0"/>
+              <a:t>External tables are simple, use SQL and can be used to transform the data in flight</a:t>
+            </a:r>
           </a:p>
         </p:txBody>
       </p:sp>
@@ -33725,91 +33710,30 @@
           <a:chExt cx="0" cy="0"/>
         </a:xfrm>
       </p:grpSpPr>
-      <p:sp>
-        <p:nvSpPr>
-          <p:cNvPr id="377" name="Shape 377"/>
-          <p:cNvSpPr txBox="1">
-            <a:spLocks noGrp="1"/>
-          </p:cNvSpPr>
-          <p:nvPr>
-            <p:ph type="title"/>
-          </p:nvPr>
-        </p:nvSpPr>
-        <p:spPr>
-          <a:xfrm>
-            <a:off x="252412" y="117997"/>
-            <a:ext cx="8410499" cy="460500"/>
-          </a:xfrm>
-          <a:prstGeom prst="rect">
-            <a:avLst/>
-          </a:prstGeom>
-          <a:noFill/>
-          <a:ln>
-            <a:noFill/>
-          </a:ln>
-        </p:spPr>
-        <p:txBody>
-          <a:bodyPr lIns="0" tIns="0" rIns="0" bIns="0" anchor="t" anchorCtr="0">
-            <a:noAutofit/>
-          </a:bodyPr>
-          <a:lstStyle/>
-          <a:p>
-            <a:pPr marL="0" marR="0" lvl="0" indent="0" algn="l" rtl="0">
-              <a:lnSpc>
-                <a:spcPct val="90000"/>
-              </a:lnSpc>
-              <a:spcBef>
-                <a:spcPts val="0"/>
-              </a:spcBef>
-              <a:buClr>
-                <a:srgbClr val="2E7D8D"/>
-              </a:buClr>
-              <a:buSzPct val="25000"/>
-              <a:buFont typeface="Arial"/>
-              <a:buNone/>
-            </a:pPr>
-            <a:r>
-              <a:rPr lang="en-US" sz="2800" dirty="0">
-                <a:solidFill>
-                  <a:srgbClr val="2E7D8D"/>
-                </a:solidFill>
-              </a:rPr>
-              <a:t>Big Data Suite </a:t>
-            </a:r>
-            <a:r>
-              <a:rPr lang="en-US" sz="2800" dirty="0" smtClean="0">
-                <a:solidFill>
-                  <a:srgbClr val="2E7D8D"/>
-                </a:solidFill>
-              </a:rPr>
-              <a:t>2.0</a:t>
-            </a:r>
-            <a:endParaRPr lang="en-US" sz="2800" dirty="0">
-              <a:solidFill>
-                <a:srgbClr val="2E7D8D"/>
-              </a:solidFill>
-            </a:endParaRPr>
-          </a:p>
-        </p:txBody>
-      </p:sp>
       <p:pic>
         <p:nvPicPr>
-          <p:cNvPr id="2" name="Picture 1"/>
+          <p:cNvPr id="4" name="Picture 3" descr="BD_MarketecturePP_White.png"/>
           <p:cNvPicPr>
             <a:picLocks noChangeAspect="1"/>
           </p:cNvPicPr>
           <p:nvPr/>
         </p:nvPicPr>
         <p:blipFill>
-          <a:blip r:embed="rId3"/>
+          <a:blip r:embed="rId3">
+            <a:extLst>
+              <a:ext uri="{28A0092B-C50C-407E-A947-70E740481C1C}">
+                <a14:useLocalDpi xmlns:a14="http://schemas.microsoft.com/office/drawing/2010/main" val="0"/>
+              </a:ext>
+            </a:extLst>
+          </a:blip>
           <a:stretch>
             <a:fillRect/>
           </a:stretch>
         </p:blipFill>
         <p:spPr>
           <a:xfrm>
-            <a:off x="680720" y="744192"/>
-            <a:ext cx="7731760" cy="3434642"/>
+            <a:off x="705882" y="-101600"/>
+            <a:ext cx="7505565" cy="4861559"/>
           </a:xfrm>
           <a:prstGeom prst="rect">
             <a:avLst/>
@@ -34803,11 +34727,7 @@
             </a:r>
             <a:r>
               <a:rPr lang="en-US" sz="1800" b="1" dirty="0"/>
-              <a:t> </a:t>
-            </a:r>
-            <a:r>
-              <a:rPr lang="en-US" sz="1800" b="1" dirty="0"/>
-              <a:t>– </a:t>
+              <a:t> – </a:t>
             </a:r>
             <a:r>
               <a:rPr lang="en-US" sz="1800" dirty="0"/>
@@ -34829,15 +34749,7 @@
           <a:p>
             <a:r>
               <a:rPr lang="en-US" sz="1800" dirty="0" smtClean="0"/>
-              <a:t>Core</a:t>
-            </a:r>
-            <a:r>
-              <a:rPr lang="en-US" sz="1800" dirty="0" smtClean="0"/>
-              <a:t> </a:t>
-            </a:r>
-            <a:r>
-              <a:rPr lang="en-US" sz="1800" dirty="0" smtClean="0"/>
-              <a:t>Hadoop components: </a:t>
+              <a:t>Core Hadoop components: </a:t>
             </a:r>
             <a:r>
               <a:rPr lang="en-US" sz="1800" b="1" dirty="0" smtClean="0"/>
@@ -34857,13 +34769,8 @@
             </a:r>
             <a:r>
               <a:rPr lang="en-US" sz="1800" b="1" dirty="0" smtClean="0"/>
-              <a:t>YARN</a:t>
-            </a:r>
-            <a:r>
-              <a:rPr lang="en-US" sz="1800" b="1" dirty="0" smtClean="0"/>
-              <a:t>.</a:t>
-            </a:r>
-            <a:endParaRPr lang="en-US" sz="1800" b="1" dirty="0" smtClean="0"/>
+              <a:t>YARN.</a:t>
+            </a:r>
           </a:p>
           <a:p>
             <a:r>
@@ -34888,33 +34795,12 @@
           <a:p>
             <a:r>
               <a:rPr lang="en-US" sz="1800" b="1" dirty="0" smtClean="0"/>
-              <a:t>YARN</a:t>
-            </a:r>
-            <a:r>
-              <a:rPr lang="en-US" sz="1800" b="1" dirty="0" smtClean="0"/>
-              <a:t> </a:t>
+              <a:t>YARN </a:t>
             </a:r>
             <a:r>
               <a:rPr lang="en-US" sz="1800" dirty="0" smtClean="0"/>
-              <a:t>is a distributed </a:t>
-            </a:r>
-            <a:r>
-              <a:rPr lang="en-US" sz="1800" dirty="0" smtClean="0"/>
-              <a:t>application</a:t>
-            </a:r>
-            <a:r>
-              <a:rPr lang="en-US" sz="1800" dirty="0" smtClean="0"/>
-              <a:t> </a:t>
-            </a:r>
-            <a:r>
-              <a:rPr lang="en-US" sz="1800" dirty="0" smtClean="0"/>
-              <a:t>framework </a:t>
-            </a:r>
-            <a:r>
-              <a:rPr lang="en-US" sz="1800" dirty="0" smtClean="0"/>
-              <a:t>with job scheduling and resource management components.</a:t>
-            </a:r>
-            <a:endParaRPr lang="en-US" sz="1800" dirty="0" smtClean="0"/>
+              <a:t>is a distributed application framework with job scheduling and resource management components.</a:t>
+            </a:r>
           </a:p>
           <a:p>
             <a:endParaRPr lang="en-US" b="1" dirty="0"/>
@@ -34954,13 +34840,6 @@
               </a:rPr>
               <a:t>*initial ODP charter to standardize these among participants</a:t>
             </a:r>
-            <a:endParaRPr lang="en-US" sz="1200" dirty="0" smtClean="0">
-              <a:solidFill>
-                <a:schemeClr val="tx2"/>
-              </a:solidFill>
-              <a:latin typeface="Arial Black"/>
-              <a:cs typeface="Arial Black"/>
-            </a:endParaRPr>
           </a:p>
         </p:txBody>
       </p:sp>
@@ -35044,18 +34923,7 @@
                 <a:ea typeface="ＭＳ Ｐゴシック" pitchFamily="34" charset="-128"/>
                 <a:cs typeface="Arial" pitchFamily="34" charset="0"/>
               </a:rPr>
-              <a:t>What is </a:t>
-            </a:r>
-            <a:r>
-              <a:rPr lang="en-US" altLang="en-US" dirty="0" smtClean="0">
-                <a:solidFill>
-                  <a:srgbClr val="008881"/>
-                </a:solidFill>
-                <a:latin typeface="Arial" pitchFamily="34" charset="0"/>
-                <a:ea typeface="ＭＳ Ｐゴシック" pitchFamily="34" charset="-128"/>
-                <a:cs typeface="Arial" pitchFamily="34" charset="0"/>
-              </a:rPr>
-              <a:t>the </a:t>
+              <a:t>What is the </a:t>
             </a:r>
             <a:r>
               <a:rPr lang="en-US" altLang="en-US" dirty="0" err="1" smtClean="0">
@@ -35079,14 +34947,6 @@
               </a:rPr>
               <a:t> Ecosystem</a:t>
             </a:r>
-            <a:endParaRPr lang="en-US" altLang="en-US" dirty="0" smtClean="0">
-              <a:solidFill>
-                <a:srgbClr val="008881"/>
-              </a:solidFill>
-              <a:latin typeface="Arial" pitchFamily="34" charset="0"/>
-              <a:ea typeface="ＭＳ Ｐゴシック" pitchFamily="34" charset="-128"/>
-              <a:cs typeface="Arial" pitchFamily="34" charset="0"/>
-            </a:endParaRPr>
           </a:p>
         </p:txBody>
       </p:sp>
@@ -35298,7 +35158,6 @@
               <a:rPr lang="en-US" sz="1200" dirty="0" smtClean="0"/>
               <a:t>Examples</a:t>
             </a:r>
-            <a:endParaRPr lang="en-US" sz="1200" dirty="0" smtClean="0"/>
           </a:p>
           <a:p>
             <a:r>
@@ -35380,7 +35239,6 @@
               <a:rPr lang="en-US" sz="1800" dirty="0" smtClean="0"/>
               <a:t>applications</a:t>
             </a:r>
-            <a:endParaRPr lang="en-US" sz="1800" dirty="0" smtClean="0"/>
           </a:p>
           <a:p>
             <a:endParaRPr lang="en-US" b="1" dirty="0"/>
@@ -38193,15 +38051,7 @@
             </a:r>
             <a:r>
               <a:rPr lang="en-US" sz="1400" dirty="0" smtClean="0"/>
-              <a:t>/</a:t>
-            </a:r>
-            <a:r>
-              <a:rPr lang="en-US" sz="1400" dirty="0" smtClean="0"/>
-              <a:t>Labs</a:t>
-            </a:r>
-            <a:r>
-              <a:rPr lang="en-US" sz="1400" dirty="0" smtClean="0"/>
-              <a:t>/PHDHAWQ/ </a:t>
+              <a:t>/Labs/PHDHAWQ/ </a:t>
             </a:r>
             <a:r>
               <a:rPr lang="en-US" sz="1000" b="1" i="1" dirty="0" smtClean="0"/>
@@ -38294,11 +38144,7 @@
             </a:r>
             <a:r>
               <a:rPr lang="en-US" sz="1400" dirty="0" smtClean="0"/>
-              <a:t> /user/</a:t>
-            </a:r>
-            <a:r>
-              <a:rPr lang="en-US" sz="1400" dirty="0" smtClean="0"/>
-              <a:t>sample</a:t>
+              <a:t> /user/sample</a:t>
             </a:r>
           </a:p>
           <a:p>
@@ -39648,15 +39494,7 @@
             </a:pPr>
             <a:r>
               <a:rPr lang="en-US" sz="1800" dirty="0" smtClean="0"/>
-              <a:t>HDFS is best at handling </a:t>
-            </a:r>
-            <a:r>
-              <a:rPr lang="en-US" sz="1800" dirty="0" smtClean="0"/>
-              <a:t>very </a:t>
-            </a:r>
-            <a:r>
-              <a:rPr lang="en-US" sz="1800" dirty="0" smtClean="0"/>
-              <a:t>big files (1 TB file </a:t>
+              <a:t>HDFS is best at handling very big files (1 TB file </a:t>
             </a:r>
             <a:r>
               <a:rPr lang="en-US" sz="1800" dirty="0" err="1" smtClean="0"/>
@@ -39664,15 +39502,7 @@
             </a:r>
             <a:r>
               <a:rPr lang="en-US" sz="1800" dirty="0" smtClean="0"/>
-              <a:t> </a:t>
-            </a:r>
-            <a:r>
-              <a:rPr lang="en-US" sz="1800" dirty="0" smtClean="0"/>
-              <a:t>1000 1 </a:t>
-            </a:r>
-            <a:r>
-              <a:rPr lang="en-US" sz="1800" dirty="0" smtClean="0"/>
-              <a:t>GB files)</a:t>
+              <a:t> 1000 1 GB files)</a:t>
             </a:r>
           </a:p>
           <a:p>
@@ -39683,15 +39513,7 @@
             </a:pPr>
             <a:r>
               <a:rPr lang="en-US" sz="1800" dirty="0" smtClean="0"/>
-              <a:t>Horizontally</a:t>
-            </a:r>
-            <a:r>
-              <a:rPr lang="en-US" sz="1800" dirty="0" smtClean="0"/>
-              <a:t> </a:t>
-            </a:r>
-            <a:r>
-              <a:rPr lang="en-US" sz="1800" dirty="0" smtClean="0"/>
-              <a:t>scalable…just add </a:t>
+              <a:t>Horizontally scalable…just add </a:t>
             </a:r>
             <a:r>
               <a:rPr lang="en-US" sz="1800" dirty="0" err="1" smtClean="0"/>

</xml_diff>